<commit_message>
New version with excel reports and more components
</commit_message>
<xml_diff>
--- a/CastReporting.Reporting/TemplatesFiles/Executive-summary-sample1.pptx
+++ b/CastReporting.Reporting/TemplatesFiles/Executive-summary-sample1.pptx
@@ -114,6 +114,22 @@
       </a:defRPr>
     </a:lvl9pPr>
   </p:defaultTextStyle>
+  <p:extLst>
+    <p:ext uri="{EFAFB233-063F-42B5-8137-9DF3F51BA10A}">
+      <p15:sldGuideLst xmlns:p15="http://schemas.microsoft.com/office/powerpoint/2012/main">
+        <p15:guide id="1" orient="horz" pos="2160">
+          <p15:clr>
+            <a:srgbClr val="A4A3A4"/>
+          </p15:clr>
+        </p15:guide>
+        <p15:guide id="2" pos="2880">
+          <p15:clr>
+            <a:srgbClr val="A4A3A4"/>
+          </p15:clr>
+        </p15:guide>
+      </p15:sldGuideLst>
+    </p:ext>
+  </p:extLst>
 </p:presentation>
 </file>
 
@@ -177,6 +193,9 @@
               <c:showBubbleSize val="0"/>
               <c:separator>
 </c:separator>
+              <c:extLst>
+                <c:ext xmlns:c15="http://schemas.microsoft.com/office/drawing/2012/chart" uri="{CE6537A1-D6FC-4f65-9D91-7224C49458BB}"/>
+              </c:extLst>
             </c:dLbl>
             <c:dLbl>
               <c:idx val="4"/>
@@ -194,7 +213,17 @@
               <c:showBubbleSize val="0"/>
               <c:separator>
 </c:separator>
+              <c:extLst>
+                <c:ext xmlns:c15="http://schemas.microsoft.com/office/drawing/2012/chart" uri="{CE6537A1-D6FC-4f65-9D91-7224C49458BB}"/>
+              </c:extLst>
             </c:dLbl>
+            <c:spPr>
+              <a:noFill/>
+              <a:ln>
+                <a:noFill/>
+              </a:ln>
+              <a:effectLst/>
+            </c:spPr>
             <c:txPr>
               <a:bodyPr/>
               <a:lstStyle/>
@@ -218,6 +247,9 @@
             <c:separator>
 </c:separator>
             <c:showLeaderLines val="1"/>
+            <c:extLst>
+              <c:ext xmlns:c15="http://schemas.microsoft.com/office/drawing/2012/chart" uri="{CE6537A1-D6FC-4f65-9D91-7224C49458BB}"/>
+            </c:extLst>
           </c:dLbls>
           <c:cat>
             <c:strRef>
@@ -470,18 +502,18 @@
           <c:showPercent val="0"/>
           <c:showBubbleSize val="0"/>
         </c:dLbls>
-        <c:axId val="48072192"/>
-        <c:axId val="48073728"/>
+        <c:axId val="470320376"/>
+        <c:axId val="470310576"/>
       </c:radarChart>
       <c:catAx>
-        <c:axId val="48072192"/>
+        <c:axId val="470320376"/>
         <c:scaling>
           <c:orientation val="minMax"/>
         </c:scaling>
         <c:delete val="0"/>
         <c:axPos val="b"/>
         <c:majorGridlines/>
-        <c:numFmt formatCode="m/d/yyyy" sourceLinked="1"/>
+        <c:numFmt formatCode="General" sourceLinked="1"/>
         <c:majorTickMark val="out"/>
         <c:minorTickMark val="none"/>
         <c:tickLblPos val="nextTo"/>
@@ -499,7 +531,7 @@
             <a:endParaRPr lang="en-US"/>
           </a:p>
         </c:txPr>
-        <c:crossAx val="48073728"/>
+        <c:crossAx val="470310576"/>
         <c:crosses val="autoZero"/>
         <c:auto val="1"/>
         <c:lblAlgn val="ctr"/>
@@ -507,7 +539,7 @@
         <c:noMultiLvlLbl val="0"/>
       </c:catAx>
       <c:valAx>
-        <c:axId val="48073728"/>
+        <c:axId val="470310576"/>
         <c:scaling>
           <c:orientation val="minMax"/>
           <c:max val="4"/>
@@ -534,7 +566,7 @@
             <a:endParaRPr lang="en-US"/>
           </a:p>
         </c:txPr>
-        <c:crossAx val="48072192"/>
+        <c:crossAx val="470320376"/>
         <c:crosses val="autoZero"/>
         <c:crossBetween val="between"/>
       </c:valAx>
@@ -627,7 +659,7 @@
               <c:strCache>
                 <c:ptCount val="1"/>
                 <c:pt idx="0">
-                  <c:v>Debt removed</c:v>
+                  <c:v>Debt removed ($)</c:v>
                 </c:pt>
               </c:strCache>
             </c:strRef>
@@ -652,7 +684,7 @@
             <c:numRef>
               <c:f>Sheet1!$A$2:$A$5</c:f>
               <c:numCache>
-                <c:formatCode>dd/mm/yyyy</c:formatCode>
+                <c:formatCode>m/d/yyyy</c:formatCode>
                 <c:ptCount val="4"/>
                 <c:pt idx="0">
                   <c:v>40787</c:v>
@@ -673,7 +705,7 @@
             <c:numRef>
               <c:f>Sheet1!$B$2:$B$5</c:f>
               <c:numCache>
-                <c:formatCode>#,##0\ "€"</c:formatCode>
+                <c:formatCode>#,##0</c:formatCode>
                 <c:ptCount val="4"/>
                 <c:pt idx="0">
                   <c:v>-2100</c:v>
@@ -700,7 +732,7 @@
               <c:strCache>
                 <c:ptCount val="1"/>
                 <c:pt idx="0">
-                  <c:v>Debt added</c:v>
+                  <c:v>Debt added ($)</c:v>
                 </c:pt>
               </c:strCache>
             </c:strRef>
@@ -720,7 +752,7 @@
             <c:numRef>
               <c:f>Sheet1!$A$2:$A$5</c:f>
               <c:numCache>
-                <c:formatCode>dd/mm/yyyy</c:formatCode>
+                <c:formatCode>m/d/yyyy</c:formatCode>
                 <c:ptCount val="4"/>
                 <c:pt idx="0">
                   <c:v>40787</c:v>
@@ -741,7 +773,7 @@
             <c:numRef>
               <c:f>Sheet1!$C$2:$C$5</c:f>
               <c:numCache>
-                <c:formatCode>#,##0\ "€"</c:formatCode>
+                <c:formatCode>#,##0</c:formatCode>
                 <c:ptCount val="4"/>
                 <c:pt idx="0">
                   <c:v>2800</c:v>
@@ -769,8 +801,8 @@
         </c:dLbls>
         <c:gapWidth val="150"/>
         <c:overlap val="100"/>
-        <c:axId val="47866624"/>
-        <c:axId val="47868160"/>
+        <c:axId val="470310184"/>
+        <c:axId val="470321160"/>
       </c:barChart>
       <c:lineChart>
         <c:grouping val="standard"/>
@@ -784,7 +816,7 @@
               <c:strCache>
                 <c:ptCount val="1"/>
                 <c:pt idx="0">
-                  <c:v>Debt</c:v>
+                  <c:v>Debt ($)</c:v>
                 </c:pt>
               </c:strCache>
             </c:strRef>
@@ -803,7 +835,7 @@
             <c:numRef>
               <c:f>Sheet1!$A$2:$A$5</c:f>
               <c:numCache>
-                <c:formatCode>dd/mm/yyyy</c:formatCode>
+                <c:formatCode>m/d/yyyy</c:formatCode>
                 <c:ptCount val="4"/>
                 <c:pt idx="0">
                   <c:v>40787</c:v>
@@ -824,7 +856,7 @@
             <c:numRef>
               <c:f>Sheet1!$D$2:$D$5</c:f>
               <c:numCache>
-                <c:formatCode>#,##0\ "€"</c:formatCode>
+                <c:formatCode>#,##0</c:formatCode>
                 <c:ptCount val="4"/>
                 <c:pt idx="0">
                   <c:v>470000</c:v>
@@ -853,17 +885,17 @@
         </c:dLbls>
         <c:marker val="1"/>
         <c:smooth val="0"/>
-        <c:axId val="47883776"/>
-        <c:axId val="47882240"/>
+        <c:axId val="470321944"/>
+        <c:axId val="470314104"/>
       </c:lineChart>
       <c:catAx>
-        <c:axId val="47866624"/>
+        <c:axId val="470310184"/>
         <c:scaling>
           <c:orientation val="minMax"/>
         </c:scaling>
         <c:delete val="0"/>
         <c:axPos val="b"/>
-        <c:numFmt formatCode="dd/mm/yyyy" sourceLinked="1"/>
+        <c:numFmt formatCode="m/d/yyyy" sourceLinked="1"/>
         <c:majorTickMark val="out"/>
         <c:minorTickMark val="none"/>
         <c:tickLblPos val="low"/>
@@ -890,7 +922,7 @@
             <a:endParaRPr lang="en-US"/>
           </a:p>
         </c:txPr>
-        <c:crossAx val="47868160"/>
+        <c:crossAx val="470321160"/>
         <c:crosses val="autoZero"/>
         <c:auto val="0"/>
         <c:lblAlgn val="ctr"/>
@@ -898,14 +930,14 @@
         <c:noMultiLvlLbl val="1"/>
       </c:catAx>
       <c:valAx>
-        <c:axId val="47868160"/>
+        <c:axId val="470321160"/>
         <c:scaling>
           <c:orientation val="minMax"/>
         </c:scaling>
         <c:delete val="0"/>
         <c:axPos val="l"/>
         <c:majorGridlines/>
-        <c:numFmt formatCode="#,##0\ &quot;€&quot;" sourceLinked="1"/>
+        <c:numFmt formatCode="#,##0" sourceLinked="1"/>
         <c:majorTickMark val="cross"/>
         <c:minorTickMark val="none"/>
         <c:tickLblPos val="nextTo"/>
@@ -932,19 +964,19 @@
             <a:endParaRPr lang="en-US"/>
           </a:p>
         </c:txPr>
-        <c:crossAx val="47866624"/>
+        <c:crossAx val="470310184"/>
         <c:crosses val="autoZero"/>
         <c:crossBetween val="between"/>
       </c:valAx>
       <c:valAx>
-        <c:axId val="47882240"/>
+        <c:axId val="470314104"/>
         <c:scaling>
           <c:orientation val="minMax"/>
           <c:min val="0"/>
         </c:scaling>
         <c:delete val="0"/>
         <c:axPos val="r"/>
-        <c:numFmt formatCode="#,##0\ &quot;€&quot;" sourceLinked="1"/>
+        <c:numFmt formatCode="#,##0" sourceLinked="1"/>
         <c:majorTickMark val="out"/>
         <c:minorTickMark val="none"/>
         <c:tickLblPos val="nextTo"/>
@@ -962,22 +994,22 @@
             <a:endParaRPr lang="en-US"/>
           </a:p>
         </c:txPr>
-        <c:crossAx val="47883776"/>
+        <c:crossAx val="470321944"/>
         <c:crosses val="max"/>
         <c:crossBetween val="between"/>
       </c:valAx>
       <c:dateAx>
-        <c:axId val="47883776"/>
+        <c:axId val="470321944"/>
         <c:scaling>
           <c:orientation val="minMax"/>
         </c:scaling>
         <c:delete val="1"/>
         <c:axPos val="b"/>
-        <c:numFmt formatCode="dd/mm/yyyy" sourceLinked="1"/>
+        <c:numFmt formatCode="m/d/yyyy" sourceLinked="1"/>
         <c:majorTickMark val="out"/>
         <c:minorTickMark val="none"/>
         <c:tickLblPos val="none"/>
-        <c:crossAx val="47882240"/>
+        <c:crossAx val="470314104"/>
         <c:crosses val="autoZero"/>
         <c:auto val="1"/>
         <c:lblOffset val="100"/>
@@ -1369,7 +1401,7 @@
             <a:fld id="{D8E3BBD6-5DF7-411E-B793-6A3558CCCDCA}" type="datetimeFigureOut">
               <a:rPr lang="fr-FR" smtClean="0"/>
               <a:pPr/>
-              <a:t>08/12/2014</a:t>
+              <a:t>01/02/2016</a:t>
             </a:fld>
             <a:endParaRPr lang="fr-FR"/>
           </a:p>
@@ -1534,7 +1566,7 @@
             <a:fld id="{D8E3BBD6-5DF7-411E-B793-6A3558CCCDCA}" type="datetimeFigureOut">
               <a:rPr lang="fr-FR" smtClean="0"/>
               <a:pPr/>
-              <a:t>08/12/2014</a:t>
+              <a:t>01/02/2016</a:t>
             </a:fld>
             <a:endParaRPr lang="fr-FR"/>
           </a:p>
@@ -3068,7 +3100,7 @@
             <a:fld id="{D8E3BBD6-5DF7-411E-B793-6A3558CCCDCA}" type="datetimeFigureOut">
               <a:rPr lang="fr-FR" smtClean="0"/>
               <a:pPr/>
-              <a:t>08/12/2014</a:t>
+              <a:t>01/02/2016</a:t>
             </a:fld>
             <a:endParaRPr lang="fr-FR"/>
           </a:p>
@@ -5493,7 +5525,7 @@
             <a:fld id="{D8E3BBD6-5DF7-411E-B793-6A3558CCCDCA}" type="datetimeFigureOut">
               <a:rPr lang="fr-FR" smtClean="0"/>
               <a:pPr/>
-              <a:t>08/12/2014</a:t>
+              <a:t>01/02/2016</a:t>
             </a:fld>
             <a:endParaRPr lang="fr-FR"/>
           </a:p>
@@ -8174,7 +8206,7 @@
             <a:fld id="{D8E3BBD6-5DF7-411E-B793-6A3558CCCDCA}" type="datetimeFigureOut">
               <a:rPr lang="fr-FR" smtClean="0"/>
               <a:pPr/>
-              <a:t>08/12/2014</a:t>
+              <a:t>01/02/2016</a:t>
             </a:fld>
             <a:endParaRPr lang="fr-FR"/>
           </a:p>
@@ -11080,7 +11112,7 @@
             <a:fld id="{D8E3BBD6-5DF7-411E-B793-6A3558CCCDCA}" type="datetimeFigureOut">
               <a:rPr lang="fr-FR" smtClean="0"/>
               <a:pPr/>
-              <a:t>08/12/2014</a:t>
+              <a:t>01/02/2016</a:t>
             </a:fld>
             <a:endParaRPr lang="fr-FR"/>
           </a:p>
@@ -12867,7 +12899,7 @@
             <a:fld id="{D8E3BBD6-5DF7-411E-B793-6A3558CCCDCA}" type="datetimeFigureOut">
               <a:rPr lang="fr-FR" smtClean="0"/>
               <a:pPr/>
-              <a:t>08/12/2014</a:t>
+              <a:t>01/02/2016</a:t>
             </a:fld>
             <a:endParaRPr lang="fr-FR"/>
           </a:p>
@@ -12947,7 +12979,7 @@
             <a:fld id="{D8E3BBD6-5DF7-411E-B793-6A3558CCCDCA}" type="datetimeFigureOut">
               <a:rPr lang="fr-FR" smtClean="0"/>
               <a:pPr/>
-              <a:t>08/12/2014</a:t>
+              <a:t>01/02/2016</a:t>
             </a:fld>
             <a:endParaRPr lang="fr-FR"/>
           </a:p>
@@ -13209,7 +13241,7 @@
             <a:fld id="{D8E3BBD6-5DF7-411E-B793-6A3558CCCDCA}" type="datetimeFigureOut">
               <a:rPr lang="fr-FR" smtClean="0"/>
               <a:pPr/>
-              <a:t>08/12/2014</a:t>
+              <a:t>01/02/2016</a:t>
             </a:fld>
             <a:endParaRPr lang="fr-FR"/>
           </a:p>
@@ -13452,7 +13484,7 @@
             <a:fld id="{D8E3BBD6-5DF7-411E-B793-6A3558CCCDCA}" type="datetimeFigureOut">
               <a:rPr lang="fr-FR" smtClean="0"/>
               <a:pPr/>
-              <a:t>08/12/2014</a:t>
+              <a:t>01/02/2016</a:t>
             </a:fld>
             <a:endParaRPr lang="fr-FR"/>
           </a:p>
@@ -13654,7 +13686,7 @@
             <a:fld id="{D8E3BBD6-5DF7-411E-B793-6A3558CCCDCA}" type="datetimeFigureOut">
               <a:rPr lang="fr-FR" smtClean="0"/>
               <a:pPr/>
-              <a:t>08/12/2014</a:t>
+              <a:t>01/02/2016</a:t>
             </a:fld>
             <a:endParaRPr lang="fr-FR"/>
           </a:p>
@@ -23093,7 +23125,7 @@
           <p:nvPr>
             <p:extLst>
               <p:ext uri="{D42A27DB-BD31-4B8C-83A1-F6EECF244321}">
-                <p14:modId xmlns:p14="http://schemas.microsoft.com/office/powerpoint/2010/main" val="3408584290"/>
+                <p14:modId xmlns:p14="http://schemas.microsoft.com/office/powerpoint/2010/main" val="3977668821"/>
               </p:ext>
             </p:extLst>
           </p:nvPr>
@@ -23109,8 +23141,8 @@
                 <a:tableStyleId>{2D5ABB26-0587-4C30-8999-92F81FD0307C}</a:tableStyleId>
               </a:tblPr>
               <a:tblGrid>
-                <a:gridCol w="4633894"/>
-                <a:gridCol w="838714"/>
+                <a:gridCol w="3764632"/>
+                <a:gridCol w="1707976"/>
               </a:tblGrid>
               <a:tr h="252775">
                 <a:tc>
@@ -23607,7 +23639,7 @@
           <p:nvPr>
             <p:extLst>
               <p:ext uri="{D42A27DB-BD31-4B8C-83A1-F6EECF244321}">
-                <p14:modId xmlns:p14="http://schemas.microsoft.com/office/powerpoint/2010/main" val="1841816508"/>
+                <p14:modId xmlns:p14="http://schemas.microsoft.com/office/powerpoint/2010/main" val="1279423700"/>
               </p:ext>
             </p:extLst>
           </p:nvPr>

</xml_diff>

<commit_message>
Removed unused master slide
</commit_message>
<xml_diff>
--- a/CastReporting.Reporting/TemplatesFiles/Executive-summary-sample1.pptx
+++ b/CastReporting.Reporting/TemplatesFiles/Executive-summary-sample1.pptx
@@ -5888,315 +5888,6 @@
 </p:sldLayout>
 </file>
 
-<file path=ppt/slideLayouts/slideLayout18.xml><?xml version="1.0" encoding="utf-8"?>
-<p:sldLayout xmlns:a="http://schemas.openxmlformats.org/drawingml/2006/main" xmlns:r="http://schemas.openxmlformats.org/officeDocument/2006/relationships" xmlns:p="http://schemas.openxmlformats.org/presentationml/2006/main" showMasterSp="0" type="title">
-  <p:cSld name="Title Slide">
-    <p:bg>
-      <p:bgPr>
-        <a:solidFill>
-          <a:schemeClr val="bg1"/>
-        </a:solidFill>
-        <a:effectLst/>
-      </p:bgPr>
-    </p:bg>
-    <p:spTree>
-      <p:nvGrpSpPr>
-        <p:cNvPr id="1" name=""/>
-        <p:cNvGrpSpPr/>
-        <p:nvPr/>
-      </p:nvGrpSpPr>
-      <p:grpSpPr>
-        <a:xfrm>
-          <a:off x="0" y="0"/>
-          <a:ext cx="0" cy="0"/>
-          <a:chOff x="0" y="0"/>
-          <a:chExt cx="0" cy="0"/>
-        </a:xfrm>
-      </p:grpSpPr>
-      <p:grpSp>
-        <p:nvGrpSpPr>
-          <p:cNvPr id="4" name="Group 3"/>
-          <p:cNvGrpSpPr/>
-          <p:nvPr userDrawn="1"/>
-        </p:nvGrpSpPr>
-        <p:grpSpPr>
-          <a:xfrm>
-            <a:off x="0" y="0"/>
-            <a:ext cx="12192000" cy="6736360"/>
-            <a:chOff x="0" y="0"/>
-            <a:chExt cx="9144000" cy="6736360"/>
-          </a:xfrm>
-        </p:grpSpPr>
-        <p:grpSp>
-          <p:nvGrpSpPr>
-            <p:cNvPr id="5" name="Group 4"/>
-            <p:cNvGrpSpPr/>
-            <p:nvPr userDrawn="1"/>
-          </p:nvGrpSpPr>
-          <p:grpSpPr>
-            <a:xfrm>
-              <a:off x="0" y="0"/>
-              <a:ext cx="9144000" cy="6736360"/>
-              <a:chOff x="0" y="0"/>
-              <a:chExt cx="9144000" cy="6736360"/>
-            </a:xfrm>
-          </p:grpSpPr>
-          <p:grpSp>
-            <p:nvGrpSpPr>
-              <p:cNvPr id="7" name="Group 6"/>
-              <p:cNvGrpSpPr/>
-              <p:nvPr userDrawn="1"/>
-            </p:nvGrpSpPr>
-            <p:grpSpPr>
-              <a:xfrm>
-                <a:off x="0" y="0"/>
-                <a:ext cx="9144000" cy="6736360"/>
-                <a:chOff x="0" y="0"/>
-                <a:chExt cx="9144000" cy="6736360"/>
-              </a:xfrm>
-            </p:grpSpPr>
-            <p:pic>
-              <p:nvPicPr>
-                <p:cNvPr id="9" name="Picture 8"/>
-                <p:cNvPicPr>
-                  <a:picLocks noChangeAspect="1"/>
-                </p:cNvPicPr>
-                <p:nvPr userDrawn="1"/>
-              </p:nvPicPr>
-              <p:blipFill rotWithShape="1">
-                <a:blip r:embed="rId2" cstate="screen">
-                  <a:extLst>
-                    <a:ext uri="{28A0092B-C50C-407E-A947-70E740481C1C}">
-                      <a14:useLocalDpi xmlns:a14="http://schemas.microsoft.com/office/drawing/2010/main" val="0"/>
-                    </a:ext>
-                  </a:extLst>
-                </a:blip>
-                <a:srcRect/>
-                <a:stretch/>
-              </p:blipFill>
-              <p:spPr>
-                <a:xfrm>
-                  <a:off x="0" y="0"/>
-                  <a:ext cx="9144000" cy="6736360"/>
-                </a:xfrm>
-                <a:prstGeom prst="rect">
-                  <a:avLst/>
-                </a:prstGeom>
-              </p:spPr>
-            </p:pic>
-            <p:sp>
-              <p:nvSpPr>
-                <p:cNvPr id="10" name="Rectangle 9"/>
-                <p:cNvSpPr/>
-                <p:nvPr userDrawn="1"/>
-              </p:nvSpPr>
-              <p:spPr bwMode="auto">
-                <a:xfrm>
-                  <a:off x="5603846" y="629174"/>
-                  <a:ext cx="3254928" cy="763398"/>
-                </a:xfrm>
-                <a:prstGeom prst="rect">
-                  <a:avLst/>
-                </a:prstGeom>
-                <a:solidFill>
-                  <a:schemeClr val="bg1"/>
-                </a:solidFill>
-                <a:ln w="9525" cap="flat" cmpd="sng" algn="ctr">
-                  <a:noFill/>
-                  <a:prstDash val="solid"/>
-                  <a:miter lim="800000"/>
-                  <a:headEnd type="none" w="med" len="med"/>
-                  <a:tailEnd type="none" w="med" len="med"/>
-                </a:ln>
-                <a:effectLst/>
-              </p:spPr>
-              <p:txBody>
-                <a:bodyPr vert="horz" wrap="none" lIns="91440" tIns="45720" rIns="91440" bIns="45720" numCol="1" rtlCol="0" anchor="t" anchorCtr="0" compatLnSpc="1">
-                  <a:prstTxWarp prst="textNoShape">
-                    <a:avLst/>
-                  </a:prstTxWarp>
-                </a:bodyPr>
-                <a:lstStyle/>
-                <a:p>
-                  <a:endParaRPr lang="en-US" sz="2400" dirty="0">
-                    <a:solidFill>
-                      <a:prstClr val="black"/>
-                    </a:solidFill>
-                    <a:latin typeface="Times New Roman" pitchFamily="18" charset="0"/>
-                    <a:cs typeface="+mn-cs"/>
-                  </a:endParaRPr>
-                </a:p>
-              </p:txBody>
-            </p:sp>
-          </p:grpSp>
-          <p:pic>
-            <p:nvPicPr>
-              <p:cNvPr id="8" name="Picture 7" descr="Cover_Cast_IceBerg_3-JSP9.jpg"/>
-              <p:cNvPicPr>
-                <a:picLocks noChangeAspect="1"/>
-              </p:cNvPicPr>
-              <p:nvPr userDrawn="1"/>
-            </p:nvPicPr>
-            <p:blipFill>
-              <a:blip r:embed="rId3" cstate="screen">
-                <a:extLst>
-                  <a:ext uri="{BEBA8EAE-BF5A-486C-A8C5-ECC9F3942E4B}">
-                    <a14:imgProps xmlns:a14="http://schemas.microsoft.com/office/drawing/2010/main">
-                      <a14:imgLayer r:embed="rId4">
-                        <a14:imgEffect>
-                          <a14:sharpenSoften amount="25000"/>
-                        </a14:imgEffect>
-                      </a14:imgLayer>
-                    </a14:imgProps>
-                  </a:ext>
-                </a:extLst>
-              </a:blip>
-              <a:srcRect/>
-              <a:stretch>
-                <a:fillRect/>
-              </a:stretch>
-            </p:blipFill>
-            <p:spPr>
-              <a:xfrm>
-                <a:off x="0" y="1524000"/>
-                <a:ext cx="9144000" cy="3048000"/>
-              </a:xfrm>
-              <a:prstGeom prst="rect">
-                <a:avLst/>
-              </a:prstGeom>
-            </p:spPr>
-          </p:pic>
-        </p:grpSp>
-        <p:pic>
-          <p:nvPicPr>
-            <p:cNvPr id="6" name="Picture 5" descr="CAST_grey_100_bl.jpg"/>
-            <p:cNvPicPr>
-              <a:picLocks noChangeAspect="1"/>
-            </p:cNvPicPr>
-            <p:nvPr userDrawn="1"/>
-          </p:nvPicPr>
-          <p:blipFill>
-            <a:blip r:embed="rId5" cstate="screen"/>
-            <a:stretch>
-              <a:fillRect/>
-            </a:stretch>
-          </p:blipFill>
-          <p:spPr>
-            <a:xfrm>
-              <a:off x="5791726" y="457200"/>
-              <a:ext cx="2818874" cy="548640"/>
-            </a:xfrm>
-            <a:prstGeom prst="rect">
-              <a:avLst/>
-            </a:prstGeom>
-          </p:spPr>
-        </p:pic>
-      </p:grpSp>
-      <p:sp>
-        <p:nvSpPr>
-          <p:cNvPr id="200706" name="Rectangle 2"/>
-          <p:cNvSpPr>
-            <a:spLocks noGrp="1" noChangeArrowheads="1"/>
-          </p:cNvSpPr>
-          <p:nvPr>
-            <p:ph type="subTitle" idx="1"/>
-          </p:nvPr>
-        </p:nvSpPr>
-        <p:spPr>
-          <a:xfrm>
-            <a:off x="609600" y="5477259"/>
-            <a:ext cx="10972800" cy="353943"/>
-          </a:xfrm>
-          <a:prstGeom prst="rect">
-            <a:avLst/>
-          </a:prstGeom>
-        </p:spPr>
-        <p:txBody>
-          <a:bodyPr vert="horz" lIns="45720" tIns="45720" rIns="45720" bIns="0" rtlCol="0">
-            <a:spAutoFit/>
-          </a:bodyPr>
-          <a:lstStyle>
-            <a:lvl1pPr marL="0" indent="0">
-              <a:buNone/>
-              <a:defRPr lang="en-US" sz="2000" b="0" i="0" dirty="0">
-                <a:solidFill>
-                  <a:schemeClr val="accent2"/>
-                </a:solidFill>
-              </a:defRPr>
-            </a:lvl1pPr>
-          </a:lstStyle>
-          <a:p>
-            <a:pPr lvl="0">
-              <a:tabLst>
-                <a:tab pos="1025525" algn="l"/>
-              </a:tabLst>
-            </a:pPr>
-            <a:r>
-              <a:rPr lang="en-US"/>
-              <a:t>Click to edit Master subtitle style</a:t>
-            </a:r>
-            <a:endParaRPr lang="en-US" dirty="0"/>
-          </a:p>
-        </p:txBody>
-      </p:sp>
-      <p:sp>
-        <p:nvSpPr>
-          <p:cNvPr id="200707" name="Rectangle 3"/>
-          <p:cNvSpPr>
-            <a:spLocks noGrp="1" noChangeArrowheads="1"/>
-          </p:cNvSpPr>
-          <p:nvPr>
-            <p:ph type="ctrTitle" sz="quarter"/>
-          </p:nvPr>
-        </p:nvSpPr>
-        <p:spPr>
-          <a:xfrm>
-            <a:off x="621792" y="5034686"/>
-            <a:ext cx="10972800" cy="378565"/>
-          </a:xfrm>
-          <a:noFill/>
-          <a:ln w="9525">
-            <a:noFill/>
-            <a:miter lim="800000"/>
-            <a:headEnd/>
-            <a:tailEnd/>
-          </a:ln>
-          <a:effectLst/>
-        </p:spPr>
-        <p:txBody>
-          <a:bodyPr vert="horz" wrap="square" lIns="45720" tIns="45720" rIns="45720" bIns="0" numCol="1" anchor="b" anchorCtr="0" compatLnSpc="1">
-            <a:prstTxWarp prst="textNoShape">
-              <a:avLst/>
-            </a:prstTxWarp>
-          </a:bodyPr>
-          <a:lstStyle>
-            <a:lvl1pPr>
-              <a:defRPr lang="en-US" sz="2400" b="1" dirty="0"/>
-            </a:lvl1pPr>
-          </a:lstStyle>
-          <a:p>
-            <a:pPr lvl="0"/>
-            <a:r>
-              <a:rPr lang="en-US"/>
-              <a:t>Click to edit Master title style</a:t>
-            </a:r>
-            <a:endParaRPr lang="en-US" dirty="0"/>
-          </a:p>
-        </p:txBody>
-      </p:sp>
-    </p:spTree>
-    <p:extLst>
-      <p:ext uri="{BB962C8B-B14F-4D97-AF65-F5344CB8AC3E}">
-        <p14:creationId xmlns:p14="http://schemas.microsoft.com/office/powerpoint/2010/main" val="2524143590"/>
-      </p:ext>
-    </p:extLst>
-  </p:cSld>
-  <p:clrMapOvr>
-    <a:masterClrMapping/>
-  </p:clrMapOvr>
-</p:sldLayout>
-</file>
-
 <file path=ppt/slideLayouts/slideLayout2.xml><?xml version="1.0" encoding="utf-8"?>
 <p:sldLayout xmlns:a="http://schemas.openxmlformats.org/drawingml/2006/main" xmlns:r="http://schemas.openxmlformats.org/officeDocument/2006/relationships" xmlns:p="http://schemas.openxmlformats.org/presentationml/2006/main" preserve="1" userDrawn="1">
   <p:cSld name="Title - Entreprise">
@@ -9785,7 +9476,6 @@
     <p:sldLayoutId id="2147483720" r:id="rId15"/>
     <p:sldLayoutId id="2147483721" r:id="rId16"/>
     <p:sldLayoutId id="2147483722" r:id="rId17"/>
-    <p:sldLayoutId id="2147483723" r:id="rId18"/>
   </p:sldLayoutIdLst>
   <p:hf hdr="0" ftr="0" dt="0"/>
   <p:txStyles>

</xml_diff>